<commit_message>
added some info to pp
</commit_message>
<xml_diff>
--- a/apresentacao_ds_infinity.pptx
+++ b/apresentacao_ds_infinity.pptx
@@ -11,6 +11,10 @@
     <p:sldId id="259" r:id="rId5"/>
     <p:sldId id="260" r:id="rId6"/>
     <p:sldId id="261" r:id="rId7"/>
+    <p:sldId id="262" r:id="rId8"/>
+    <p:sldId id="263" r:id="rId9"/>
+    <p:sldId id="264" r:id="rId10"/>
+    <p:sldId id="265" r:id="rId11"/>
   </p:sldIdLst>
   <p:sldSz cx="12192000" cy="6858000"/>
   <p:notesSz cx="6858000" cy="9144000"/>
@@ -110,6 +114,190 @@
     </a:lvl9pPr>
   </p:defaultTextStyle>
 </p:presentation>
+</file>
+
+<file path=ppt/changesInfos/changesInfo1.xml><?xml version="1.0" encoding="utf-8"?>
+<pc:chgInfo xmlns:a="http://schemas.openxmlformats.org/drawingml/2006/main" xmlns:r="http://schemas.openxmlformats.org/officeDocument/2006/relationships" xmlns:ac="http://schemas.microsoft.com/office/drawing/2013/main/command" xmlns:pc="http://schemas.microsoft.com/office/powerpoint/2013/main/command">
+  <pc:docChgLst>
+    <pc:chgData name="iago teles" userId="1695390d8d727d6c" providerId="LiveId" clId="{25B31A80-3DD4-48E2-BB51-4FA7C662A010}"/>
+    <pc:docChg chg="custSel addSld delSld modSld">
+      <pc:chgData name="iago teles" userId="1695390d8d727d6c" providerId="LiveId" clId="{25B31A80-3DD4-48E2-BB51-4FA7C662A010}" dt="2025-02-03T16:38:24.834" v="135" actId="207"/>
+      <pc:docMkLst>
+        <pc:docMk/>
+      </pc:docMkLst>
+      <pc:sldChg chg="modSp">
+        <pc:chgData name="iago teles" userId="1695390d8d727d6c" providerId="LiveId" clId="{25B31A80-3DD4-48E2-BB51-4FA7C662A010}" dt="2025-02-03T16:33:34.593" v="0" actId="1076"/>
+        <pc:sldMkLst>
+          <pc:docMk/>
+          <pc:sldMk cId="2165191986" sldId="261"/>
+        </pc:sldMkLst>
+        <pc:spChg chg="mod">
+          <ac:chgData name="iago teles" userId="1695390d8d727d6c" providerId="LiveId" clId="{25B31A80-3DD4-48E2-BB51-4FA7C662A010}" dt="2025-02-03T16:33:34.593" v="0" actId="1076"/>
+          <ac:spMkLst>
+            <pc:docMk/>
+            <pc:sldMk cId="2165191986" sldId="261"/>
+            <ac:spMk id="4" creationId="{0FF02BEC-7F72-484F-BBB7-E91DB0CCBAB1}"/>
+          </ac:spMkLst>
+        </pc:spChg>
+      </pc:sldChg>
+      <pc:sldChg chg="addSp delSp modSp add">
+        <pc:chgData name="iago teles" userId="1695390d8d727d6c" providerId="LiveId" clId="{25B31A80-3DD4-48E2-BB51-4FA7C662A010}" dt="2025-02-03T16:35:19.472" v="31"/>
+        <pc:sldMkLst>
+          <pc:docMk/>
+          <pc:sldMk cId="1719320405" sldId="262"/>
+        </pc:sldMkLst>
+        <pc:spChg chg="mod">
+          <ac:chgData name="iago teles" userId="1695390d8d727d6c" providerId="LiveId" clId="{25B31A80-3DD4-48E2-BB51-4FA7C662A010}" dt="2025-02-03T16:33:55.996" v="11" actId="20577"/>
+          <ac:spMkLst>
+            <pc:docMk/>
+            <pc:sldMk cId="1719320405" sldId="262"/>
+            <ac:spMk id="2" creationId="{9894A542-2237-4F2D-9A6E-765E0E226067}"/>
+          </ac:spMkLst>
+        </pc:spChg>
+        <pc:spChg chg="mod">
+          <ac:chgData name="iago teles" userId="1695390d8d727d6c" providerId="LiveId" clId="{25B31A80-3DD4-48E2-BB51-4FA7C662A010}" dt="2025-02-03T16:34:57.455" v="29" actId="20577"/>
+          <ac:spMkLst>
+            <pc:docMk/>
+            <pc:sldMk cId="1719320405" sldId="262"/>
+            <ac:spMk id="4" creationId="{0FF02BEC-7F72-484F-BBB7-E91DB0CCBAB1}"/>
+          </ac:spMkLst>
+        </pc:spChg>
+        <pc:spChg chg="add del">
+          <ac:chgData name="iago teles" userId="1695390d8d727d6c" providerId="LiveId" clId="{25B31A80-3DD4-48E2-BB51-4FA7C662A010}" dt="2025-02-03T16:35:19.472" v="31"/>
+          <ac:spMkLst>
+            <pc:docMk/>
+            <pc:sldMk cId="1719320405" sldId="262"/>
+            <ac:spMk id="5" creationId="{A2A87024-64FD-4A32-8B5C-BA7088AB429B}"/>
+          </ac:spMkLst>
+        </pc:spChg>
+        <pc:picChg chg="del">
+          <ac:chgData name="iago teles" userId="1695390d8d727d6c" providerId="LiveId" clId="{25B31A80-3DD4-48E2-BB51-4FA7C662A010}" dt="2025-02-03T16:34:07.020" v="12" actId="478"/>
+          <ac:picMkLst>
+            <pc:docMk/>
+            <pc:sldMk cId="1719320405" sldId="262"/>
+            <ac:picMk id="3" creationId="{272EEA4D-92CA-4DE3-BD5D-04DD103F0863}"/>
+          </ac:picMkLst>
+        </pc:picChg>
+        <pc:picChg chg="add mod">
+          <ac:chgData name="iago teles" userId="1695390d8d727d6c" providerId="LiveId" clId="{25B31A80-3DD4-48E2-BB51-4FA7C662A010}" dt="2025-02-03T16:34:27.256" v="17" actId="14100"/>
+          <ac:picMkLst>
+            <pc:docMk/>
+            <pc:sldMk cId="1719320405" sldId="262"/>
+            <ac:picMk id="6146" creationId="{6E0759BF-C5EC-419E-8EEB-A3A28D341CBF}"/>
+          </ac:picMkLst>
+        </pc:picChg>
+      </pc:sldChg>
+      <pc:sldChg chg="addSp delSp modSp add">
+        <pc:chgData name="iago teles" userId="1695390d8d727d6c" providerId="LiveId" clId="{25B31A80-3DD4-48E2-BB51-4FA7C662A010}" dt="2025-02-03T16:35:50.265" v="69" actId="1076"/>
+        <pc:sldMkLst>
+          <pc:docMk/>
+          <pc:sldMk cId="2890127190" sldId="263"/>
+        </pc:sldMkLst>
+        <pc:spChg chg="mod">
+          <ac:chgData name="iago teles" userId="1695390d8d727d6c" providerId="LiveId" clId="{25B31A80-3DD4-48E2-BB51-4FA7C662A010}" dt="2025-02-03T16:35:27.548" v="62" actId="20577"/>
+          <ac:spMkLst>
+            <pc:docMk/>
+            <pc:sldMk cId="2890127190" sldId="263"/>
+            <ac:spMk id="2" creationId="{9894A542-2237-4F2D-9A6E-765E0E226067}"/>
+          </ac:spMkLst>
+        </pc:spChg>
+        <pc:spChg chg="del">
+          <ac:chgData name="iago teles" userId="1695390d8d727d6c" providerId="LiveId" clId="{25B31A80-3DD4-48E2-BB51-4FA7C662A010}" dt="2025-02-03T16:35:44.333" v="67" actId="478"/>
+          <ac:spMkLst>
+            <pc:docMk/>
+            <pc:sldMk cId="2890127190" sldId="263"/>
+            <ac:spMk id="4" creationId="{0FF02BEC-7F72-484F-BBB7-E91DB0CCBAB1}"/>
+          </ac:spMkLst>
+        </pc:spChg>
+        <pc:picChg chg="del">
+          <ac:chgData name="iago teles" userId="1695390d8d727d6c" providerId="LiveId" clId="{25B31A80-3DD4-48E2-BB51-4FA7C662A010}" dt="2025-02-03T16:35:34.970" v="63" actId="478"/>
+          <ac:picMkLst>
+            <pc:docMk/>
+            <pc:sldMk cId="2890127190" sldId="263"/>
+            <ac:picMk id="6146" creationId="{6E0759BF-C5EC-419E-8EEB-A3A28D341CBF}"/>
+          </ac:picMkLst>
+        </pc:picChg>
+        <pc:picChg chg="add mod">
+          <ac:chgData name="iago teles" userId="1695390d8d727d6c" providerId="LiveId" clId="{25B31A80-3DD4-48E2-BB51-4FA7C662A010}" dt="2025-02-03T16:35:50.265" v="69" actId="1076"/>
+          <ac:picMkLst>
+            <pc:docMk/>
+            <pc:sldMk cId="2890127190" sldId="263"/>
+            <ac:picMk id="7170" creationId="{A420206C-141B-4E26-84DE-03B38C7E141B}"/>
+          </ac:picMkLst>
+        </pc:picChg>
+      </pc:sldChg>
+      <pc:sldChg chg="addSp delSp modSp add">
+        <pc:chgData name="iago teles" userId="1695390d8d727d6c" providerId="LiveId" clId="{25B31A80-3DD4-48E2-BB51-4FA7C662A010}" dt="2025-02-03T16:38:24.834" v="135" actId="207"/>
+        <pc:sldMkLst>
+          <pc:docMk/>
+          <pc:sldMk cId="1834492594" sldId="264"/>
+        </pc:sldMkLst>
+        <pc:spChg chg="mod">
+          <ac:chgData name="iago teles" userId="1695390d8d727d6c" providerId="LiveId" clId="{25B31A80-3DD4-48E2-BB51-4FA7C662A010}" dt="2025-02-03T16:36:50.991" v="106" actId="20577"/>
+          <ac:spMkLst>
+            <pc:docMk/>
+            <pc:sldMk cId="1834492594" sldId="264"/>
+            <ac:spMk id="2" creationId="{9894A542-2237-4F2D-9A6E-765E0E226067}"/>
+          </ac:spMkLst>
+        </pc:spChg>
+        <pc:spChg chg="add mod">
+          <ac:chgData name="iago teles" userId="1695390d8d727d6c" providerId="LiveId" clId="{25B31A80-3DD4-48E2-BB51-4FA7C662A010}" dt="2025-02-03T16:38:24.834" v="135" actId="207"/>
+          <ac:spMkLst>
+            <pc:docMk/>
+            <pc:sldMk cId="1834492594" sldId="264"/>
+            <ac:spMk id="3" creationId="{6E86C364-6F70-402C-B5ED-6C083F531DF9}"/>
+          </ac:spMkLst>
+        </pc:spChg>
+        <pc:spChg chg="add del">
+          <ac:chgData name="iago teles" userId="1695390d8d727d6c" providerId="LiveId" clId="{25B31A80-3DD4-48E2-BB51-4FA7C662A010}" dt="2025-02-03T16:37:51.002" v="115"/>
+          <ac:spMkLst>
+            <pc:docMk/>
+            <pc:sldMk cId="1834492594" sldId="264"/>
+            <ac:spMk id="4" creationId="{59EEC7D6-63C4-4F0F-843C-87539489FF7F}"/>
+          </ac:spMkLst>
+        </pc:spChg>
+        <pc:picChg chg="del">
+          <ac:chgData name="iago teles" userId="1695390d8d727d6c" providerId="LiveId" clId="{25B31A80-3DD4-48E2-BB51-4FA7C662A010}" dt="2025-02-03T16:36:43.343" v="71" actId="478"/>
+          <ac:picMkLst>
+            <pc:docMk/>
+            <pc:sldMk cId="1834492594" sldId="264"/>
+            <ac:picMk id="7170" creationId="{A420206C-141B-4E26-84DE-03B38C7E141B}"/>
+          </ac:picMkLst>
+        </pc:picChg>
+      </pc:sldChg>
+      <pc:sldChg chg="modSp add">
+        <pc:chgData name="iago teles" userId="1695390d8d727d6c" providerId="LiveId" clId="{25B31A80-3DD4-48E2-BB51-4FA7C662A010}" dt="2025-02-03T16:38:19.705" v="134" actId="20577"/>
+        <pc:sldMkLst>
+          <pc:docMk/>
+          <pc:sldMk cId="973233295" sldId="265"/>
+        </pc:sldMkLst>
+        <pc:spChg chg="mod">
+          <ac:chgData name="iago teles" userId="1695390d8d727d6c" providerId="LiveId" clId="{25B31A80-3DD4-48E2-BB51-4FA7C662A010}" dt="2025-02-03T16:38:05.584" v="127" actId="20577"/>
+          <ac:spMkLst>
+            <pc:docMk/>
+            <pc:sldMk cId="973233295" sldId="265"/>
+            <ac:spMk id="2" creationId="{9894A542-2237-4F2D-9A6E-765E0E226067}"/>
+          </ac:spMkLst>
+        </pc:spChg>
+        <pc:spChg chg="mod">
+          <ac:chgData name="iago teles" userId="1695390d8d727d6c" providerId="LiveId" clId="{25B31A80-3DD4-48E2-BB51-4FA7C662A010}" dt="2025-02-03T16:38:19.705" v="134" actId="20577"/>
+          <ac:spMkLst>
+            <pc:docMk/>
+            <pc:sldMk cId="973233295" sldId="265"/>
+            <ac:spMk id="3" creationId="{6E86C364-6F70-402C-B5ED-6C083F531DF9}"/>
+          </ac:spMkLst>
+        </pc:spChg>
+      </pc:sldChg>
+      <pc:sldChg chg="add del">
+        <pc:chgData name="iago teles" userId="1695390d8d727d6c" providerId="LiveId" clId="{25B31A80-3DD4-48E2-BB51-4FA7C662A010}" dt="2025-02-03T16:38:01.222" v="118" actId="47"/>
+        <pc:sldMkLst>
+          <pc:docMk/>
+          <pc:sldMk cId="1821731032" sldId="266"/>
+        </pc:sldMkLst>
+      </pc:sldChg>
+    </pc:docChg>
+  </pc:docChgLst>
+</pc:chgInfo>
 </file>
 
 <file path=ppt/slideLayouts/slideLayout1.xml><?xml version="1.0" encoding="utf-8"?>
@@ -13262,6 +13450,174 @@
 </p:sld>
 </file>
 
+<file path=ppt/slides/slide10.xml><?xml version="1.0" encoding="utf-8"?>
+<p:sld xmlns:a="http://schemas.openxmlformats.org/drawingml/2006/main" xmlns:r="http://schemas.openxmlformats.org/officeDocument/2006/relationships" xmlns:p="http://schemas.openxmlformats.org/presentationml/2006/main">
+  <p:cSld>
+    <p:spTree>
+      <p:nvGrpSpPr>
+        <p:cNvPr id="1" name=""/>
+        <p:cNvGrpSpPr/>
+        <p:nvPr/>
+      </p:nvGrpSpPr>
+      <p:grpSpPr>
+        <a:xfrm>
+          <a:off x="0" y="0"/>
+          <a:ext cx="0" cy="0"/>
+          <a:chOff x="0" y="0"/>
+          <a:chExt cx="0" cy="0"/>
+        </a:xfrm>
+      </p:grpSpPr>
+      <p:sp>
+        <p:nvSpPr>
+          <p:cNvPr id="2" name="Título 1">
+            <a:extLst>
+              <a:ext uri="{FF2B5EF4-FFF2-40B4-BE49-F238E27FC236}">
+                <a16:creationId xmlns:a16="http://schemas.microsoft.com/office/drawing/2014/main" id="{9894A542-2237-4F2D-9A6E-765E0E226067}"/>
+              </a:ext>
+            </a:extLst>
+          </p:cNvPr>
+          <p:cNvSpPr>
+            <a:spLocks noGrp="1"/>
+          </p:cNvSpPr>
+          <p:nvPr>
+            <p:ph type="ctrTitle"/>
+          </p:nvPr>
+        </p:nvSpPr>
+        <p:spPr>
+          <a:xfrm>
+            <a:off x="1154955" y="889000"/>
+            <a:ext cx="8825658" cy="660400"/>
+          </a:xfrm>
+        </p:spPr>
+        <p:txBody>
+          <a:bodyPr/>
+          <a:lstStyle/>
+          <a:p>
+            <a:r>
+              <a:rPr lang="pt-BR" sz="2000" b="1" dirty="0"/>
+              <a:t>Conclusão</a:t>
+            </a:r>
+            <a:endParaRPr lang="pt-BR" sz="2000" dirty="0"/>
+          </a:p>
+        </p:txBody>
+      </p:sp>
+      <p:sp>
+        <p:nvSpPr>
+          <p:cNvPr id="3" name="Retângulo 2">
+            <a:extLst>
+              <a:ext uri="{FF2B5EF4-FFF2-40B4-BE49-F238E27FC236}">
+                <a16:creationId xmlns:a16="http://schemas.microsoft.com/office/drawing/2014/main" id="{6E86C364-6F70-402C-B5ED-6C083F531DF9}"/>
+              </a:ext>
+            </a:extLst>
+          </p:cNvPr>
+          <p:cNvSpPr/>
+          <p:nvPr/>
+        </p:nvSpPr>
+        <p:spPr>
+          <a:xfrm>
+            <a:off x="1154955" y="1627075"/>
+            <a:ext cx="7142378" cy="2031325"/>
+          </a:xfrm>
+          <a:prstGeom prst="rect">
+            <a:avLst/>
+          </a:prstGeom>
+        </p:spPr>
+        <p:txBody>
+          <a:bodyPr wrap="square">
+            <a:spAutoFit/>
+          </a:bodyPr>
+          <a:lstStyle/>
+          <a:p>
+            <a:r>
+              <a:rPr lang="pt-BR" dirty="0">
+                <a:solidFill>
+                  <a:schemeClr val="bg1"/>
+                </a:solidFill>
+              </a:rPr>
+              <a:t>O </a:t>
+            </a:r>
+            <a:r>
+              <a:rPr lang="pt-BR" dirty="0" err="1">
+                <a:solidFill>
+                  <a:schemeClr val="bg1"/>
+                </a:solidFill>
+              </a:rPr>
+              <a:t>dataset</a:t>
+            </a:r>
+            <a:r>
+              <a:rPr lang="pt-BR" dirty="0">
+                <a:solidFill>
+                  <a:schemeClr val="bg1"/>
+                </a:solidFill>
+              </a:rPr>
+              <a:t> mostrou um padrão claro de descontos elevados e produtos bem avaliados.</a:t>
+            </a:r>
+          </a:p>
+          <a:p>
+            <a:endParaRPr lang="pt-BR" dirty="0">
+              <a:solidFill>
+                <a:schemeClr val="bg1"/>
+              </a:solidFill>
+            </a:endParaRPr>
+          </a:p>
+          <a:p>
+            <a:r>
+              <a:rPr lang="pt-BR" dirty="0">
+                <a:solidFill>
+                  <a:schemeClr val="bg1"/>
+                </a:solidFill>
+              </a:rPr>
+              <a:t>A área de Eletrônicos domina as vendas e descontos.</a:t>
+            </a:r>
+          </a:p>
+          <a:p>
+            <a:endParaRPr lang="pt-BR" dirty="0">
+              <a:solidFill>
+                <a:schemeClr val="bg1"/>
+              </a:solidFill>
+            </a:endParaRPr>
+          </a:p>
+          <a:p>
+            <a:r>
+              <a:rPr lang="pt-BR" dirty="0">
+                <a:solidFill>
+                  <a:schemeClr val="bg1"/>
+                </a:solidFill>
+              </a:rPr>
+              <a:t>A previsão de vendas pode ser melhorada com mais dados e ajuste de </a:t>
+            </a:r>
+            <a:r>
+              <a:rPr lang="pt-BR" dirty="0" err="1">
+                <a:solidFill>
+                  <a:schemeClr val="bg1"/>
+                </a:solidFill>
+              </a:rPr>
+              <a:t>hiperparâmetros</a:t>
+            </a:r>
+            <a:r>
+              <a:rPr lang="pt-BR" dirty="0">
+                <a:solidFill>
+                  <a:schemeClr val="bg1"/>
+                </a:solidFill>
+              </a:rPr>
+              <a:t>.</a:t>
+            </a:r>
+          </a:p>
+        </p:txBody>
+      </p:sp>
+    </p:spTree>
+    <p:extLst>
+      <p:ext uri="{BB962C8B-B14F-4D97-AF65-F5344CB8AC3E}">
+        <p14:creationId xmlns:p14="http://schemas.microsoft.com/office/powerpoint/2010/main" val="973233295"/>
+      </p:ext>
+    </p:extLst>
+  </p:cSld>
+  <p:clrMapOvr>
+    <a:masterClrMapping/>
+  </p:clrMapOvr>
+</p:sld>
+</file>
+
 <file path=ppt/slides/slide2.xml><?xml version="1.0" encoding="utf-8"?>
 <p:sld xmlns:a="http://schemas.openxmlformats.org/drawingml/2006/main" xmlns:r="http://schemas.openxmlformats.org/officeDocument/2006/relationships" xmlns:p="http://schemas.openxmlformats.org/presentationml/2006/main">
   <p:cSld>
@@ -14656,7 +15012,7 @@
         </p:nvSpPr>
         <p:spPr>
           <a:xfrm>
-            <a:off x="533400" y="3742267"/>
+            <a:off x="524933" y="3556001"/>
             <a:ext cx="11286066" cy="2862322"/>
           </a:xfrm>
           <a:prstGeom prst="rect">
@@ -14808,6 +15164,728 @@
     <p:extLst>
       <p:ext uri="{BB962C8B-B14F-4D97-AF65-F5344CB8AC3E}">
         <p14:creationId xmlns:p14="http://schemas.microsoft.com/office/powerpoint/2010/main" val="2165191986"/>
+      </p:ext>
+    </p:extLst>
+  </p:cSld>
+  <p:clrMapOvr>
+    <a:masterClrMapping/>
+  </p:clrMapOvr>
+</p:sld>
+</file>
+
+<file path=ppt/slides/slide7.xml><?xml version="1.0" encoding="utf-8"?>
+<p:sld xmlns:a="http://schemas.openxmlformats.org/drawingml/2006/main" xmlns:r="http://schemas.openxmlformats.org/officeDocument/2006/relationships" xmlns:p="http://schemas.openxmlformats.org/presentationml/2006/main">
+  <p:cSld>
+    <p:spTree>
+      <p:nvGrpSpPr>
+        <p:cNvPr id="1" name=""/>
+        <p:cNvGrpSpPr/>
+        <p:nvPr/>
+      </p:nvGrpSpPr>
+      <p:grpSpPr>
+        <a:xfrm>
+          <a:off x="0" y="0"/>
+          <a:ext cx="0" cy="0"/>
+          <a:chOff x="0" y="0"/>
+          <a:chExt cx="0" cy="0"/>
+        </a:xfrm>
+      </p:grpSpPr>
+      <p:sp>
+        <p:nvSpPr>
+          <p:cNvPr id="2" name="Título 1">
+            <a:extLst>
+              <a:ext uri="{FF2B5EF4-FFF2-40B4-BE49-F238E27FC236}">
+                <a16:creationId xmlns:a16="http://schemas.microsoft.com/office/drawing/2014/main" id="{9894A542-2237-4F2D-9A6E-765E0E226067}"/>
+              </a:ext>
+            </a:extLst>
+          </p:cNvPr>
+          <p:cNvSpPr>
+            <a:spLocks noGrp="1"/>
+          </p:cNvSpPr>
+          <p:nvPr>
+            <p:ph type="ctrTitle"/>
+          </p:nvPr>
+        </p:nvSpPr>
+        <p:spPr>
+          <a:xfrm>
+            <a:off x="1154955" y="889000"/>
+            <a:ext cx="8825658" cy="660400"/>
+          </a:xfrm>
+        </p:spPr>
+        <p:txBody>
+          <a:bodyPr/>
+          <a:lstStyle/>
+          <a:p>
+            <a:r>
+              <a:rPr lang="pt-BR" sz="2000" b="1" dirty="0"/>
+              <a:t>Avaliações</a:t>
+            </a:r>
+            <a:endParaRPr lang="pt-BR" sz="2000" dirty="0"/>
+          </a:p>
+        </p:txBody>
+      </p:sp>
+      <p:sp>
+        <p:nvSpPr>
+          <p:cNvPr id="4" name="Retângulo 3">
+            <a:extLst>
+              <a:ext uri="{FF2B5EF4-FFF2-40B4-BE49-F238E27FC236}">
+                <a16:creationId xmlns:a16="http://schemas.microsoft.com/office/drawing/2014/main" id="{0FF02BEC-7F72-484F-BBB7-E91DB0CCBAB1}"/>
+              </a:ext>
+            </a:extLst>
+          </p:cNvPr>
+          <p:cNvSpPr/>
+          <p:nvPr/>
+        </p:nvSpPr>
+        <p:spPr>
+          <a:xfrm>
+            <a:off x="5638800" y="1549400"/>
+            <a:ext cx="5334000" cy="5262979"/>
+          </a:xfrm>
+          <a:prstGeom prst="rect">
+            <a:avLst/>
+          </a:prstGeom>
+        </p:spPr>
+        <p:txBody>
+          <a:bodyPr wrap="square">
+            <a:spAutoFit/>
+          </a:bodyPr>
+          <a:lstStyle/>
+          <a:p>
+            <a:r>
+              <a:rPr lang="pt-BR" sz="2000" dirty="0">
+                <a:solidFill>
+                  <a:schemeClr val="bg1"/>
+                </a:solidFill>
+              </a:rPr>
+              <a:t>Segundo o gráfico, notamos que na totalidade 75.9% dos produtos possuem uma boa avaliação, enquanto 24.1 possui uma avaliação inferior a 4, que pode ser considerado ruim.</a:t>
+            </a:r>
+          </a:p>
+          <a:p>
+            <a:br>
+              <a:rPr lang="pt-BR" sz="2000" dirty="0">
+                <a:solidFill>
+                  <a:schemeClr val="bg1"/>
+                </a:solidFill>
+              </a:rPr>
+            </a:br>
+            <a:r>
+              <a:rPr lang="pt-BR" sz="2000" dirty="0">
+                <a:solidFill>
+                  <a:schemeClr val="bg1"/>
+                </a:solidFill>
+              </a:rPr>
+              <a:t>Nota-se então, que a loja vende, em sua maioria, produtos que são bem avaliados pelo cliente, mas ainda assim isso é algo que tem bastante espaço para melhorias.</a:t>
+            </a:r>
+          </a:p>
+          <a:p>
+            <a:br>
+              <a:rPr lang="pt-BR" sz="2000" dirty="0">
+                <a:solidFill>
+                  <a:schemeClr val="bg1"/>
+                </a:solidFill>
+              </a:rPr>
+            </a:br>
+            <a:r>
+              <a:rPr lang="pt-BR" sz="2000" dirty="0">
+                <a:solidFill>
+                  <a:schemeClr val="bg1"/>
+                </a:solidFill>
+              </a:rPr>
+              <a:t>Totalidade de produtos:</a:t>
+            </a:r>
+          </a:p>
+          <a:p>
+            <a:r>
+              <a:rPr lang="pt-BR" sz="2000" dirty="0">
+                <a:solidFill>
+                  <a:schemeClr val="bg1"/>
+                </a:solidFill>
+              </a:rPr>
+              <a:t>- com boa avaliação: 1109</a:t>
+            </a:r>
+          </a:p>
+          <a:p>
+            <a:r>
+              <a:rPr lang="pt-BR" sz="2000" dirty="0">
+                <a:solidFill>
+                  <a:schemeClr val="bg1"/>
+                </a:solidFill>
+              </a:rPr>
+              <a:t>- com má avaliação: 353</a:t>
+            </a:r>
+          </a:p>
+          <a:p>
+            <a:br>
+              <a:rPr lang="pt-BR" dirty="0">
+                <a:solidFill>
+                  <a:srgbClr val="D4D4D4"/>
+                </a:solidFill>
+                <a:latin typeface="Courier New" panose="02070309020205020404" pitchFamily="49" charset="0"/>
+              </a:rPr>
+            </a:br>
+            <a:endParaRPr lang="pt-BR" dirty="0">
+              <a:solidFill>
+                <a:srgbClr val="D4D4D4"/>
+              </a:solidFill>
+              <a:latin typeface="Courier New" panose="02070309020205020404" pitchFamily="49" charset="0"/>
+            </a:endParaRPr>
+          </a:p>
+        </p:txBody>
+      </p:sp>
+      <p:pic>
+        <p:nvPicPr>
+          <p:cNvPr id="6146" name="Picture 2">
+            <a:extLst>
+              <a:ext uri="{FF2B5EF4-FFF2-40B4-BE49-F238E27FC236}">
+                <a16:creationId xmlns:a16="http://schemas.microsoft.com/office/drawing/2014/main" id="{6E0759BF-C5EC-419E-8EEB-A3A28D341CBF}"/>
+              </a:ext>
+            </a:extLst>
+          </p:cNvPr>
+          <p:cNvPicPr>
+            <a:picLocks noChangeAspect="1" noChangeArrowheads="1"/>
+          </p:cNvPicPr>
+          <p:nvPr/>
+        </p:nvPicPr>
+        <p:blipFill>
+          <a:blip r:embed="rId2">
+            <a:extLst>
+              <a:ext uri="{28A0092B-C50C-407E-A947-70E740481C1C}">
+                <a14:useLocalDpi xmlns:a14="http://schemas.microsoft.com/office/drawing/2010/main" val="0"/>
+              </a:ext>
+            </a:extLst>
+          </a:blip>
+          <a:srcRect/>
+          <a:stretch>
+            <a:fillRect/>
+          </a:stretch>
+        </p:blipFill>
+        <p:spPr bwMode="auto">
+          <a:xfrm>
+            <a:off x="1154955" y="1724025"/>
+            <a:ext cx="3950445" cy="4091031"/>
+          </a:xfrm>
+          <a:prstGeom prst="rect">
+            <a:avLst/>
+          </a:prstGeom>
+          <a:noFill/>
+          <a:extLst>
+            <a:ext uri="{909E8E84-426E-40DD-AFC4-6F175D3DCCD1}">
+              <a14:hiddenFill xmlns:a14="http://schemas.microsoft.com/office/drawing/2010/main">
+                <a:solidFill>
+                  <a:srgbClr val="FFFFFF"/>
+                </a:solidFill>
+              </a14:hiddenFill>
+            </a:ext>
+          </a:extLst>
+        </p:spPr>
+      </p:pic>
+    </p:spTree>
+    <p:extLst>
+      <p:ext uri="{BB962C8B-B14F-4D97-AF65-F5344CB8AC3E}">
+        <p14:creationId xmlns:p14="http://schemas.microsoft.com/office/powerpoint/2010/main" val="1719320405"/>
+      </p:ext>
+    </p:extLst>
+  </p:cSld>
+  <p:clrMapOvr>
+    <a:masterClrMapping/>
+  </p:clrMapOvr>
+</p:sld>
+</file>
+
+<file path=ppt/slides/slide8.xml><?xml version="1.0" encoding="utf-8"?>
+<p:sld xmlns:a="http://schemas.openxmlformats.org/drawingml/2006/main" xmlns:r="http://schemas.openxmlformats.org/officeDocument/2006/relationships" xmlns:p="http://schemas.openxmlformats.org/presentationml/2006/main">
+  <p:cSld>
+    <p:spTree>
+      <p:nvGrpSpPr>
+        <p:cNvPr id="1" name=""/>
+        <p:cNvGrpSpPr/>
+        <p:nvPr/>
+      </p:nvGrpSpPr>
+      <p:grpSpPr>
+        <a:xfrm>
+          <a:off x="0" y="0"/>
+          <a:ext cx="0" cy="0"/>
+          <a:chOff x="0" y="0"/>
+          <a:chExt cx="0" cy="0"/>
+        </a:xfrm>
+      </p:grpSpPr>
+      <p:sp>
+        <p:nvSpPr>
+          <p:cNvPr id="2" name="Título 1">
+            <a:extLst>
+              <a:ext uri="{FF2B5EF4-FFF2-40B4-BE49-F238E27FC236}">
+                <a16:creationId xmlns:a16="http://schemas.microsoft.com/office/drawing/2014/main" id="{9894A542-2237-4F2D-9A6E-765E0E226067}"/>
+              </a:ext>
+            </a:extLst>
+          </p:cNvPr>
+          <p:cNvSpPr>
+            <a:spLocks noGrp="1"/>
+          </p:cNvSpPr>
+          <p:nvPr>
+            <p:ph type="ctrTitle"/>
+          </p:nvPr>
+        </p:nvSpPr>
+        <p:spPr>
+          <a:xfrm>
+            <a:off x="1154955" y="889000"/>
+            <a:ext cx="8825658" cy="660400"/>
+          </a:xfrm>
+        </p:spPr>
+        <p:txBody>
+          <a:bodyPr/>
+          <a:lstStyle/>
+          <a:p>
+            <a:r>
+              <a:rPr lang="pt-BR" sz="2000" b="1" dirty="0"/>
+              <a:t>Top 10 produtos mais avaliados</a:t>
+            </a:r>
+            <a:endParaRPr lang="pt-BR" sz="2000" dirty="0"/>
+          </a:p>
+        </p:txBody>
+      </p:sp>
+      <p:pic>
+        <p:nvPicPr>
+          <p:cNvPr id="7170" name="Picture 2">
+            <a:extLst>
+              <a:ext uri="{FF2B5EF4-FFF2-40B4-BE49-F238E27FC236}">
+                <a16:creationId xmlns:a16="http://schemas.microsoft.com/office/drawing/2014/main" id="{A420206C-141B-4E26-84DE-03B38C7E141B}"/>
+              </a:ext>
+            </a:extLst>
+          </p:cNvPr>
+          <p:cNvPicPr>
+            <a:picLocks noChangeAspect="1" noChangeArrowheads="1"/>
+          </p:cNvPicPr>
+          <p:nvPr/>
+        </p:nvPicPr>
+        <p:blipFill>
+          <a:blip r:embed="rId2">
+            <a:extLst>
+              <a:ext uri="{28A0092B-C50C-407E-A947-70E740481C1C}">
+                <a14:useLocalDpi xmlns:a14="http://schemas.microsoft.com/office/drawing/2010/main" val="0"/>
+              </a:ext>
+            </a:extLst>
+          </a:blip>
+          <a:srcRect/>
+          <a:stretch>
+            <a:fillRect/>
+          </a:stretch>
+        </p:blipFill>
+        <p:spPr bwMode="auto">
+          <a:xfrm>
+            <a:off x="1060077" y="1652589"/>
+            <a:ext cx="10071845" cy="3396624"/>
+          </a:xfrm>
+          <a:prstGeom prst="rect">
+            <a:avLst/>
+          </a:prstGeom>
+          <a:noFill/>
+          <a:extLst>
+            <a:ext uri="{909E8E84-426E-40DD-AFC4-6F175D3DCCD1}">
+              <a14:hiddenFill xmlns:a14="http://schemas.microsoft.com/office/drawing/2010/main">
+                <a:solidFill>
+                  <a:srgbClr val="FFFFFF"/>
+                </a:solidFill>
+              </a14:hiddenFill>
+            </a:ext>
+          </a:extLst>
+        </p:spPr>
+      </p:pic>
+    </p:spTree>
+    <p:extLst>
+      <p:ext uri="{BB962C8B-B14F-4D97-AF65-F5344CB8AC3E}">
+        <p14:creationId xmlns:p14="http://schemas.microsoft.com/office/powerpoint/2010/main" val="2890127190"/>
+      </p:ext>
+    </p:extLst>
+  </p:cSld>
+  <p:clrMapOvr>
+    <a:masterClrMapping/>
+  </p:clrMapOvr>
+</p:sld>
+</file>
+
+<file path=ppt/slides/slide9.xml><?xml version="1.0" encoding="utf-8"?>
+<p:sld xmlns:a="http://schemas.openxmlformats.org/drawingml/2006/main" xmlns:r="http://schemas.openxmlformats.org/officeDocument/2006/relationships" xmlns:p="http://schemas.openxmlformats.org/presentationml/2006/main">
+  <p:cSld>
+    <p:spTree>
+      <p:nvGrpSpPr>
+        <p:cNvPr id="1" name=""/>
+        <p:cNvGrpSpPr/>
+        <p:nvPr/>
+      </p:nvGrpSpPr>
+      <p:grpSpPr>
+        <a:xfrm>
+          <a:off x="0" y="0"/>
+          <a:ext cx="0" cy="0"/>
+          <a:chOff x="0" y="0"/>
+          <a:chExt cx="0" cy="0"/>
+        </a:xfrm>
+      </p:grpSpPr>
+      <p:sp>
+        <p:nvSpPr>
+          <p:cNvPr id="2" name="Título 1">
+            <a:extLst>
+              <a:ext uri="{FF2B5EF4-FFF2-40B4-BE49-F238E27FC236}">
+                <a16:creationId xmlns:a16="http://schemas.microsoft.com/office/drawing/2014/main" id="{9894A542-2237-4F2D-9A6E-765E0E226067}"/>
+              </a:ext>
+            </a:extLst>
+          </p:cNvPr>
+          <p:cNvSpPr>
+            <a:spLocks noGrp="1"/>
+          </p:cNvSpPr>
+          <p:nvPr>
+            <p:ph type="ctrTitle"/>
+          </p:nvPr>
+        </p:nvSpPr>
+        <p:spPr>
+          <a:xfrm>
+            <a:off x="1154955" y="889000"/>
+            <a:ext cx="8825658" cy="660400"/>
+          </a:xfrm>
+        </p:spPr>
+        <p:txBody>
+          <a:bodyPr/>
+          <a:lstStyle/>
+          <a:p>
+            <a:r>
+              <a:rPr lang="pt-BR" sz="2000" b="1" dirty="0"/>
+              <a:t>Modelagem de </a:t>
+            </a:r>
+            <a:r>
+              <a:rPr lang="pt-BR" sz="2000" b="1" dirty="0" err="1"/>
+              <a:t>Machine</a:t>
+            </a:r>
+            <a:r>
+              <a:rPr lang="pt-BR" sz="2000" b="1" dirty="0"/>
+              <a:t> Learning</a:t>
+            </a:r>
+            <a:endParaRPr lang="pt-BR" sz="2000" dirty="0"/>
+          </a:p>
+        </p:txBody>
+      </p:sp>
+      <p:sp>
+        <p:nvSpPr>
+          <p:cNvPr id="3" name="Retângulo 2">
+            <a:extLst>
+              <a:ext uri="{FF2B5EF4-FFF2-40B4-BE49-F238E27FC236}">
+                <a16:creationId xmlns:a16="http://schemas.microsoft.com/office/drawing/2014/main" id="{6E86C364-6F70-402C-B5ED-6C083F531DF9}"/>
+              </a:ext>
+            </a:extLst>
+          </p:cNvPr>
+          <p:cNvSpPr/>
+          <p:nvPr/>
+        </p:nvSpPr>
+        <p:spPr>
+          <a:xfrm>
+            <a:off x="1154955" y="1627075"/>
+            <a:ext cx="7142378" cy="4247317"/>
+          </a:xfrm>
+          <a:prstGeom prst="rect">
+            <a:avLst/>
+          </a:prstGeom>
+        </p:spPr>
+        <p:txBody>
+          <a:bodyPr wrap="square">
+            <a:spAutoFit/>
+          </a:bodyPr>
+          <a:lstStyle/>
+          <a:p>
+            <a:r>
+              <a:rPr lang="pt-BR" b="1" dirty="0">
+                <a:solidFill>
+                  <a:schemeClr val="bg1"/>
+                </a:solidFill>
+              </a:rPr>
+              <a:t>Modelos Testados:</a:t>
+            </a:r>
+          </a:p>
+          <a:p>
+            <a:pPr>
+              <a:buFont typeface="+mj-lt"/>
+              <a:buAutoNum type="arabicPeriod"/>
+            </a:pPr>
+            <a:r>
+              <a:rPr lang="pt-BR" b="1" dirty="0">
+                <a:solidFill>
+                  <a:schemeClr val="bg1"/>
+                </a:solidFill>
+              </a:rPr>
+              <a:t>Regressão Linear</a:t>
+            </a:r>
+            <a:endParaRPr lang="pt-BR" dirty="0">
+              <a:solidFill>
+                <a:schemeClr val="bg1"/>
+              </a:solidFill>
+            </a:endParaRPr>
+          </a:p>
+          <a:p>
+            <a:pPr marL="742950" lvl="1" indent="-285750">
+              <a:buFont typeface="+mj-lt"/>
+              <a:buAutoNum type="arabicPeriod"/>
+            </a:pPr>
+            <a:r>
+              <a:rPr lang="pt-BR" dirty="0">
+                <a:solidFill>
+                  <a:schemeClr val="bg1"/>
+                </a:solidFill>
+              </a:rPr>
+              <a:t>MSE: </a:t>
+            </a:r>
+            <a:r>
+              <a:rPr lang="pt-BR" b="1" dirty="0">
+                <a:solidFill>
+                  <a:schemeClr val="bg1"/>
+                </a:solidFill>
+              </a:rPr>
+              <a:t>6851.37</a:t>
+            </a:r>
+            <a:endParaRPr lang="pt-BR" dirty="0">
+              <a:solidFill>
+                <a:schemeClr val="bg1"/>
+              </a:solidFill>
+            </a:endParaRPr>
+          </a:p>
+          <a:p>
+            <a:pPr marL="742950" lvl="1" indent="-285750">
+              <a:buFont typeface="+mj-lt"/>
+              <a:buAutoNum type="arabicPeriod"/>
+            </a:pPr>
+            <a:r>
+              <a:rPr lang="pt-BR" dirty="0">
+                <a:solidFill>
+                  <a:schemeClr val="bg1"/>
+                </a:solidFill>
+              </a:rPr>
+              <a:t>RMSE: </a:t>
+            </a:r>
+            <a:r>
+              <a:rPr lang="pt-BR" b="1" dirty="0">
+                <a:solidFill>
+                  <a:schemeClr val="bg1"/>
+                </a:solidFill>
+              </a:rPr>
+              <a:t>82.77</a:t>
+            </a:r>
+            <a:endParaRPr lang="pt-BR" dirty="0">
+              <a:solidFill>
+                <a:schemeClr val="bg1"/>
+              </a:solidFill>
+            </a:endParaRPr>
+          </a:p>
+          <a:p>
+            <a:pPr marL="742950" lvl="1" indent="-285750">
+              <a:buFont typeface="+mj-lt"/>
+              <a:buAutoNum type="arabicPeriod"/>
+            </a:pPr>
+            <a:r>
+              <a:rPr lang="pt-BR" dirty="0">
+                <a:solidFill>
+                  <a:schemeClr val="bg1"/>
+                </a:solidFill>
+              </a:rPr>
+              <a:t>R²: </a:t>
+            </a:r>
+            <a:r>
+              <a:rPr lang="pt-BR" b="1" dirty="0">
+                <a:solidFill>
+                  <a:schemeClr val="bg1"/>
+                </a:solidFill>
+              </a:rPr>
+              <a:t>0.93</a:t>
+            </a:r>
+          </a:p>
+          <a:p>
+            <a:pPr marL="742950" lvl="1" indent="-285750">
+              <a:buFont typeface="+mj-lt"/>
+              <a:buAutoNum type="arabicPeriod"/>
+            </a:pPr>
+            <a:endParaRPr lang="pt-BR" dirty="0">
+              <a:solidFill>
+                <a:schemeClr val="bg1"/>
+              </a:solidFill>
+            </a:endParaRPr>
+          </a:p>
+          <a:p>
+            <a:pPr>
+              <a:buFont typeface="+mj-lt"/>
+              <a:buAutoNum type="arabicPeriod"/>
+            </a:pPr>
+            <a:r>
+              <a:rPr lang="pt-BR" b="1" dirty="0">
+                <a:solidFill>
+                  <a:schemeClr val="bg1"/>
+                </a:solidFill>
+              </a:rPr>
+              <a:t>Árvore de Decisão</a:t>
+            </a:r>
+            <a:endParaRPr lang="pt-BR" dirty="0">
+              <a:solidFill>
+                <a:schemeClr val="bg1"/>
+              </a:solidFill>
+            </a:endParaRPr>
+          </a:p>
+          <a:p>
+            <a:pPr marL="742950" lvl="1" indent="-285750">
+              <a:buFont typeface="+mj-lt"/>
+              <a:buAutoNum type="arabicPeriod"/>
+            </a:pPr>
+            <a:r>
+              <a:rPr lang="pt-BR" dirty="0">
+                <a:solidFill>
+                  <a:schemeClr val="bg1"/>
+                </a:solidFill>
+              </a:rPr>
+              <a:t>MSE: </a:t>
+            </a:r>
+            <a:r>
+              <a:rPr lang="pt-BR" b="1" dirty="0">
+                <a:solidFill>
+                  <a:schemeClr val="bg1"/>
+                </a:solidFill>
+              </a:rPr>
+              <a:t>1303.85</a:t>
+            </a:r>
+            <a:endParaRPr lang="pt-BR" dirty="0">
+              <a:solidFill>
+                <a:schemeClr val="bg1"/>
+              </a:solidFill>
+            </a:endParaRPr>
+          </a:p>
+          <a:p>
+            <a:pPr marL="742950" lvl="1" indent="-285750">
+              <a:buFont typeface="+mj-lt"/>
+              <a:buAutoNum type="arabicPeriod"/>
+            </a:pPr>
+            <a:r>
+              <a:rPr lang="pt-BR" dirty="0">
+                <a:solidFill>
+                  <a:schemeClr val="bg1"/>
+                </a:solidFill>
+              </a:rPr>
+              <a:t>RMSE: </a:t>
+            </a:r>
+            <a:r>
+              <a:rPr lang="pt-BR" b="1" dirty="0">
+                <a:solidFill>
+                  <a:schemeClr val="bg1"/>
+                </a:solidFill>
+              </a:rPr>
+              <a:t>36.11</a:t>
+            </a:r>
+            <a:endParaRPr lang="pt-BR" dirty="0">
+              <a:solidFill>
+                <a:schemeClr val="bg1"/>
+              </a:solidFill>
+            </a:endParaRPr>
+          </a:p>
+          <a:p>
+            <a:pPr marL="742950" lvl="1" indent="-285750">
+              <a:buFont typeface="+mj-lt"/>
+              <a:buAutoNum type="arabicPeriod"/>
+            </a:pPr>
+            <a:r>
+              <a:rPr lang="pt-BR" dirty="0">
+                <a:solidFill>
+                  <a:schemeClr val="bg1"/>
+                </a:solidFill>
+              </a:rPr>
+              <a:t>R²: </a:t>
+            </a:r>
+            <a:r>
+              <a:rPr lang="pt-BR" b="1" dirty="0">
+                <a:solidFill>
+                  <a:schemeClr val="bg1"/>
+                </a:solidFill>
+              </a:rPr>
+              <a:t>0.99</a:t>
+            </a:r>
+          </a:p>
+          <a:p>
+            <a:pPr lvl="1"/>
+            <a:endParaRPr lang="pt-BR" dirty="0">
+              <a:solidFill>
+                <a:schemeClr val="bg1"/>
+              </a:solidFill>
+            </a:endParaRPr>
+          </a:p>
+          <a:p>
+            <a:r>
+              <a:rPr lang="pt-BR" b="1" dirty="0">
+                <a:solidFill>
+                  <a:schemeClr val="bg1"/>
+                </a:solidFill>
+              </a:rPr>
+              <a:t>Conclusões:</a:t>
+            </a:r>
+            <a:endParaRPr lang="pt-BR" dirty="0">
+              <a:solidFill>
+                <a:schemeClr val="bg1"/>
+              </a:solidFill>
+            </a:endParaRPr>
+          </a:p>
+          <a:p>
+            <a:pPr>
+              <a:buFont typeface="Arial" panose="020B0604020202020204" pitchFamily="34" charset="0"/>
+              <a:buChar char="•"/>
+            </a:pPr>
+            <a:r>
+              <a:rPr lang="pt-BR" dirty="0">
+                <a:solidFill>
+                  <a:schemeClr val="bg1"/>
+                </a:solidFill>
+              </a:rPr>
+              <a:t>Árvore de Decisão apresentou melhor performance.</a:t>
+            </a:r>
+          </a:p>
+          <a:p>
+            <a:pPr>
+              <a:buFont typeface="Arial" panose="020B0604020202020204" pitchFamily="34" charset="0"/>
+              <a:buChar char="•"/>
+            </a:pPr>
+            <a:r>
+              <a:rPr lang="pt-BR" dirty="0">
+                <a:solidFill>
+                  <a:schemeClr val="bg1"/>
+                </a:solidFill>
+              </a:rPr>
+              <a:t>Alto R² (0.99) pode indicar </a:t>
+            </a:r>
+            <a:r>
+              <a:rPr lang="pt-BR" b="1" dirty="0" err="1">
+                <a:solidFill>
+                  <a:schemeClr val="bg1"/>
+                </a:solidFill>
+              </a:rPr>
+              <a:t>overfitting</a:t>
+            </a:r>
+            <a:r>
+              <a:rPr lang="pt-BR" dirty="0">
+                <a:solidFill>
+                  <a:schemeClr val="bg1"/>
+                </a:solidFill>
+              </a:rPr>
+              <a:t>.</a:t>
+            </a:r>
+          </a:p>
+          <a:p>
+            <a:pPr>
+              <a:buFont typeface="Arial" panose="020B0604020202020204" pitchFamily="34" charset="0"/>
+              <a:buChar char="•"/>
+            </a:pPr>
+            <a:r>
+              <a:rPr lang="pt-BR" dirty="0">
+                <a:solidFill>
+                  <a:schemeClr val="bg1"/>
+                </a:solidFill>
+              </a:rPr>
+              <a:t>Modelo pode ser refinado para melhor generalização.</a:t>
+            </a:r>
+          </a:p>
+        </p:txBody>
+      </p:sp>
+    </p:spTree>
+    <p:extLst>
+      <p:ext uri="{BB962C8B-B14F-4D97-AF65-F5344CB8AC3E}">
+        <p14:creationId xmlns:p14="http://schemas.microsoft.com/office/powerpoint/2010/main" val="1834492594"/>
       </p:ext>
     </p:extLst>
   </p:cSld>

</xml_diff>